<commit_message>
add powerpoint outline for tensorflow
</commit_message>
<xml_diff>
--- a/tf/Introduction to TensorFlow.pptx
+++ b/tf/Introduction to TensorFlow.pptx
@@ -5,11 +5,22 @@
     <p:sldMasterId id="2147483707" r:id="rId1"/>
   </p:sldMasterIdLst>
   <p:notesMasterIdLst>
-    <p:notesMasterId r:id="rId4"/>
+    <p:notesMasterId r:id="rId15"/>
   </p:notesMasterIdLst>
   <p:sldIdLst>
     <p:sldId id="266" r:id="rId2"/>
-    <p:sldId id="268" r:id="rId3"/>
+    <p:sldId id="269" r:id="rId3"/>
+    <p:sldId id="273" r:id="rId4"/>
+    <p:sldId id="270" r:id="rId5"/>
+    <p:sldId id="271" r:id="rId6"/>
+    <p:sldId id="272" r:id="rId7"/>
+    <p:sldId id="275" r:id="rId8"/>
+    <p:sldId id="276" r:id="rId9"/>
+    <p:sldId id="274" r:id="rId10"/>
+    <p:sldId id="277" r:id="rId11"/>
+    <p:sldId id="278" r:id="rId12"/>
+    <p:sldId id="279" r:id="rId13"/>
+    <p:sldId id="268" r:id="rId14"/>
   </p:sldIdLst>
   <p:sldSz cx="12192000" cy="6858000"/>
   <p:notesSz cx="6858000" cy="9144000"/>
@@ -198,7 +209,7 @@
           <a:p>
             <a:fld id="{D46E3B93-8523-4DBC-8FC5-65A9B9CDE5EE}" type="datetimeFigureOut">
               <a:rPr lang="en-US" smtClean="0"/>
-              <a:t>8/7/2019</a:t>
+              <a:t>10/28/2019</a:t>
             </a:fld>
             <a:endParaRPr lang="en-US"/>
           </a:p>
@@ -594,7 +605,7 @@
           <a:p>
             <a:fld id="{CE8F6EB4-B6EF-44F6-BBD1-CD5E279CFAE2}" type="datetime4">
               <a:rPr lang="en-US" smtClean="0"/>
-              <a:t>August 7, 2019</a:t>
+              <a:t>October 28, 2019</a:t>
             </a:fld>
             <a:endParaRPr lang="en-US" dirty="0"/>
           </a:p>
@@ -766,7 +777,7 @@
           <a:p>
             <a:fld id="{8A405AA7-4C18-4A99-8AAA-8677C1976FC9}" type="datetime4">
               <a:rPr lang="en-US" smtClean="0"/>
-              <a:t>August 7, 2019</a:t>
+              <a:t>October 28, 2019</a:t>
             </a:fld>
             <a:endParaRPr lang="en-US" dirty="0"/>
           </a:p>
@@ -948,7 +959,7 @@
           <a:p>
             <a:fld id="{4EA0D668-33DD-41B9-B668-7E7FF430C345}" type="datetime4">
               <a:rPr lang="en-US" smtClean="0"/>
-              <a:t>August 7, 2019</a:t>
+              <a:t>October 28, 2019</a:t>
             </a:fld>
             <a:endParaRPr lang="en-US" dirty="0"/>
           </a:p>
@@ -1131,7 +1142,7 @@
           <a:p>
             <a:fld id="{8AAE40A0-A7D8-4DC3-BC9E-BADA32DA2004}" type="datetime4">
               <a:rPr lang="en-US" smtClean="0"/>
-              <a:t>August 7, 2019</a:t>
+              <a:t>October 28, 2019</a:t>
             </a:fld>
             <a:endParaRPr lang="en-US" dirty="0"/>
           </a:p>
@@ -1448,7 +1459,7 @@
           <a:p>
             <a:fld id="{B08FEED8-D7D4-44E9-BFBC-ED06B5996D94}" type="datetime4">
               <a:rPr lang="en-US" smtClean="0"/>
-              <a:t>August 7, 2019</a:t>
+              <a:t>October 28, 2019</a:t>
             </a:fld>
             <a:endParaRPr lang="en-US" dirty="0"/>
           </a:p>
@@ -1748,7 +1759,7 @@
           <a:p>
             <a:fld id="{A143C325-9442-4629-8CC6-5CAC69736C93}" type="datetime4">
               <a:rPr lang="en-US" smtClean="0"/>
-              <a:t>August 7, 2019</a:t>
+              <a:t>October 28, 2019</a:t>
             </a:fld>
             <a:endParaRPr lang="en-US" dirty="0"/>
           </a:p>
@@ -2116,7 +2127,7 @@
           <a:p>
             <a:fld id="{EEDAFACB-3FED-4607-9FDD-34A82581A119}" type="datetime4">
               <a:rPr lang="en-US" smtClean="0"/>
-              <a:t>August 7, 2019</a:t>
+              <a:t>October 28, 2019</a:t>
             </a:fld>
             <a:endParaRPr lang="en-US" dirty="0"/>
           </a:p>
@@ -2237,7 +2248,7 @@
           <a:p>
             <a:fld id="{EC2805D6-2E3E-42F7-ABBA-DCD51C704328}" type="datetime4">
               <a:rPr lang="en-US" smtClean="0"/>
-              <a:t>August 7, 2019</a:t>
+              <a:t>October 28, 2019</a:t>
             </a:fld>
             <a:endParaRPr lang="en-US" dirty="0"/>
           </a:p>
@@ -2336,7 +2347,7 @@
           <a:p>
             <a:fld id="{7A745AAB-8888-45FB-8C4E-B86AF9A05200}" type="datetime4">
               <a:rPr lang="en-US" smtClean="0"/>
-              <a:t>August 7, 2019</a:t>
+              <a:t>October 28, 2019</a:t>
             </a:fld>
             <a:endParaRPr lang="en-US" dirty="0"/>
           </a:p>
@@ -2615,7 +2626,7 @@
           <a:p>
             <a:fld id="{9F896CED-8AFA-412F-B61A-472E6093CDBA}" type="datetime4">
               <a:rPr lang="en-US" smtClean="0"/>
-              <a:t>August 7, 2019</a:t>
+              <a:t>October 28, 2019</a:t>
             </a:fld>
             <a:endParaRPr lang="en-US" dirty="0"/>
           </a:p>
@@ -2874,7 +2885,7 @@
           <a:p>
             <a:fld id="{61078AB2-2970-444D-B1FF-A9F37FC020F5}" type="datetime4">
               <a:rPr lang="en-US" smtClean="0"/>
-              <a:t>August 7, 2019</a:t>
+              <a:t>October 28, 2019</a:t>
             </a:fld>
             <a:endParaRPr lang="en-US" dirty="0"/>
           </a:p>
@@ -3092,7 +3103,7 @@
           <a:p>
             <a:fld id="{1148AE1E-D441-45CD-8192-49B13802301D}" type="datetime4">
               <a:rPr lang="en-US" smtClean="0"/>
-              <a:t>August 7, 2019</a:t>
+              <a:t>October 28, 2019</a:t>
             </a:fld>
             <a:endParaRPr lang="en-US" dirty="0"/>
           </a:p>
@@ -3566,6 +3577,10 @@
               </a:rPr>
               <a:t>Introduction to </a:t>
             </a:r>
+            <a:r>
+              <a:rPr lang="en-US" b="1" dirty="0"/>
+              <a:t/>
+            </a:r>
             <a:br>
               <a:rPr lang="en-US" b="1" dirty="0"/>
             </a:br>
@@ -3805,6 +3820,423 @@
 </p:sld>
 </file>
 
+<file path=ppt/slides/slide10.xml><?xml version="1.0" encoding="utf-8"?>
+<p:sld xmlns:a="http://schemas.openxmlformats.org/drawingml/2006/main" xmlns:r="http://schemas.openxmlformats.org/officeDocument/2006/relationships" xmlns:p="http://schemas.openxmlformats.org/presentationml/2006/main">
+  <p:cSld>
+    <p:spTree>
+      <p:nvGrpSpPr>
+        <p:cNvPr id="1" name=""/>
+        <p:cNvGrpSpPr/>
+        <p:nvPr/>
+      </p:nvGrpSpPr>
+      <p:grpSpPr>
+        <a:xfrm>
+          <a:off x="0" y="0"/>
+          <a:ext cx="0" cy="0"/>
+          <a:chOff x="0" y="0"/>
+          <a:chExt cx="0" cy="0"/>
+        </a:xfrm>
+      </p:grpSpPr>
+      <p:sp>
+        <p:nvSpPr>
+          <p:cNvPr id="4" name="Title 3"/>
+          <p:cNvSpPr>
+            <a:spLocks noGrp="1"/>
+          </p:cNvSpPr>
+          <p:nvPr>
+            <p:ph type="title"/>
+          </p:nvPr>
+        </p:nvSpPr>
+        <p:spPr/>
+        <p:txBody>
+          <a:bodyPr/>
+          <a:lstStyle/>
+          <a:p>
+            <a:r>
+              <a:rPr lang="en-US" dirty="0" smtClean="0"/>
+              <a:t>TEXT-BASED MODELS</a:t>
+            </a:r>
+            <a:endParaRPr lang="en-US" dirty="0"/>
+          </a:p>
+        </p:txBody>
+      </p:sp>
+      <p:sp>
+        <p:nvSpPr>
+          <p:cNvPr id="5" name="Content Placeholder 4"/>
+          <p:cNvSpPr>
+            <a:spLocks noGrp="1"/>
+          </p:cNvSpPr>
+          <p:nvPr>
+            <p:ph idx="1"/>
+          </p:nvPr>
+        </p:nvSpPr>
+        <p:spPr/>
+        <p:txBody>
+          <a:bodyPr/>
+          <a:lstStyle/>
+          <a:p>
+            <a:endParaRPr lang="en-US" dirty="0"/>
+          </a:p>
+        </p:txBody>
+      </p:sp>
+    </p:spTree>
+    <p:extLst>
+      <p:ext uri="{BB962C8B-B14F-4D97-AF65-F5344CB8AC3E}">
+        <p14:creationId xmlns:p14="http://schemas.microsoft.com/office/powerpoint/2010/main" val="2031667520"/>
+      </p:ext>
+    </p:extLst>
+  </p:cSld>
+  <p:clrMapOvr>
+    <a:masterClrMapping/>
+  </p:clrMapOvr>
+</p:sld>
+</file>
+
+<file path=ppt/slides/slide11.xml><?xml version="1.0" encoding="utf-8"?>
+<p:sld xmlns:a="http://schemas.openxmlformats.org/drawingml/2006/main" xmlns:r="http://schemas.openxmlformats.org/officeDocument/2006/relationships" xmlns:p="http://schemas.openxmlformats.org/presentationml/2006/main">
+  <p:cSld>
+    <p:spTree>
+      <p:nvGrpSpPr>
+        <p:cNvPr id="1" name=""/>
+        <p:cNvGrpSpPr/>
+        <p:nvPr/>
+      </p:nvGrpSpPr>
+      <p:grpSpPr>
+        <a:xfrm>
+          <a:off x="0" y="0"/>
+          <a:ext cx="0" cy="0"/>
+          <a:chOff x="0" y="0"/>
+          <a:chExt cx="0" cy="0"/>
+        </a:xfrm>
+      </p:grpSpPr>
+      <p:sp>
+        <p:nvSpPr>
+          <p:cNvPr id="4" name="Title 3"/>
+          <p:cNvSpPr>
+            <a:spLocks noGrp="1"/>
+          </p:cNvSpPr>
+          <p:nvPr>
+            <p:ph type="title"/>
+          </p:nvPr>
+        </p:nvSpPr>
+        <p:spPr/>
+        <p:txBody>
+          <a:bodyPr/>
+          <a:lstStyle/>
+          <a:p>
+            <a:r>
+              <a:rPr lang="en-US" dirty="0" smtClean="0"/>
+              <a:t>VIDEO MODELS</a:t>
+            </a:r>
+            <a:endParaRPr lang="en-US" dirty="0"/>
+          </a:p>
+        </p:txBody>
+      </p:sp>
+      <p:sp>
+        <p:nvSpPr>
+          <p:cNvPr id="5" name="Content Placeholder 4"/>
+          <p:cNvSpPr>
+            <a:spLocks noGrp="1"/>
+          </p:cNvSpPr>
+          <p:nvPr>
+            <p:ph idx="1"/>
+          </p:nvPr>
+        </p:nvSpPr>
+        <p:spPr/>
+        <p:txBody>
+          <a:bodyPr/>
+          <a:lstStyle/>
+          <a:p>
+            <a:endParaRPr lang="en-US" dirty="0"/>
+          </a:p>
+        </p:txBody>
+      </p:sp>
+    </p:spTree>
+    <p:extLst>
+      <p:ext uri="{BB962C8B-B14F-4D97-AF65-F5344CB8AC3E}">
+        <p14:creationId xmlns:p14="http://schemas.microsoft.com/office/powerpoint/2010/main" val="113501044"/>
+      </p:ext>
+    </p:extLst>
+  </p:cSld>
+  <p:clrMapOvr>
+    <a:masterClrMapping/>
+  </p:clrMapOvr>
+</p:sld>
+</file>
+
+<file path=ppt/slides/slide12.xml><?xml version="1.0" encoding="utf-8"?>
+<p:sld xmlns:a="http://schemas.openxmlformats.org/drawingml/2006/main" xmlns:r="http://schemas.openxmlformats.org/officeDocument/2006/relationships" xmlns:p="http://schemas.openxmlformats.org/presentationml/2006/main">
+  <p:cSld>
+    <p:spTree>
+      <p:nvGrpSpPr>
+        <p:cNvPr id="1" name=""/>
+        <p:cNvGrpSpPr/>
+        <p:nvPr/>
+      </p:nvGrpSpPr>
+      <p:grpSpPr>
+        <a:xfrm>
+          <a:off x="0" y="0"/>
+          <a:ext cx="0" cy="0"/>
+          <a:chOff x="0" y="0"/>
+          <a:chExt cx="0" cy="0"/>
+        </a:xfrm>
+      </p:grpSpPr>
+      <p:sp>
+        <p:nvSpPr>
+          <p:cNvPr id="4" name="Title 3"/>
+          <p:cNvSpPr>
+            <a:spLocks noGrp="1"/>
+          </p:cNvSpPr>
+          <p:nvPr>
+            <p:ph type="title"/>
+          </p:nvPr>
+        </p:nvSpPr>
+        <p:spPr/>
+        <p:txBody>
+          <a:bodyPr/>
+          <a:lstStyle/>
+          <a:p>
+            <a:r>
+              <a:rPr lang="en-US" dirty="0" smtClean="0"/>
+              <a:t>INTERPRETABILITY</a:t>
+            </a:r>
+            <a:endParaRPr lang="en-US" dirty="0"/>
+          </a:p>
+        </p:txBody>
+      </p:sp>
+      <p:sp>
+        <p:nvSpPr>
+          <p:cNvPr id="5" name="Content Placeholder 4"/>
+          <p:cNvSpPr>
+            <a:spLocks noGrp="1"/>
+          </p:cNvSpPr>
+          <p:nvPr>
+            <p:ph idx="1"/>
+          </p:nvPr>
+        </p:nvSpPr>
+        <p:spPr/>
+        <p:txBody>
+          <a:bodyPr/>
+          <a:lstStyle/>
+          <a:p>
+            <a:endParaRPr lang="en-US" dirty="0"/>
+          </a:p>
+        </p:txBody>
+      </p:sp>
+    </p:spTree>
+    <p:extLst>
+      <p:ext uri="{BB962C8B-B14F-4D97-AF65-F5344CB8AC3E}">
+        <p14:creationId xmlns:p14="http://schemas.microsoft.com/office/powerpoint/2010/main" val="3018532001"/>
+      </p:ext>
+    </p:extLst>
+  </p:cSld>
+  <p:clrMapOvr>
+    <a:masterClrMapping/>
+  </p:clrMapOvr>
+</p:sld>
+</file>
+
+<file path=ppt/slides/slide13.xml><?xml version="1.0" encoding="utf-8"?>
+<p:sld xmlns:a="http://schemas.openxmlformats.org/drawingml/2006/main" xmlns:r="http://schemas.openxmlformats.org/officeDocument/2006/relationships" xmlns:p="http://schemas.openxmlformats.org/presentationml/2006/main">
+  <p:cSld>
+    <p:spTree>
+      <p:nvGrpSpPr>
+        <p:cNvPr id="1" name=""/>
+        <p:cNvGrpSpPr/>
+        <p:nvPr/>
+      </p:nvGrpSpPr>
+      <p:grpSpPr>
+        <a:xfrm>
+          <a:off x="0" y="0"/>
+          <a:ext cx="0" cy="0"/>
+          <a:chOff x="0" y="0"/>
+          <a:chExt cx="0" cy="0"/>
+        </a:xfrm>
+      </p:grpSpPr>
+      <p:sp>
+        <p:nvSpPr>
+          <p:cNvPr id="7" name="Title 6">
+            <a:extLst>
+              <a:ext uri="{FF2B5EF4-FFF2-40B4-BE49-F238E27FC236}">
+                <a16:creationId xmlns:a16="http://schemas.microsoft.com/office/drawing/2014/main" id="{495B4BC0-844B-4414-A623-BEF78AAC1BA1}"/>
+              </a:ext>
+            </a:extLst>
+          </p:cNvPr>
+          <p:cNvSpPr>
+            <a:spLocks noGrp="1"/>
+          </p:cNvSpPr>
+          <p:nvPr>
+            <p:ph type="title"/>
+          </p:nvPr>
+        </p:nvSpPr>
+        <p:spPr/>
+        <p:txBody>
+          <a:bodyPr/>
+          <a:lstStyle/>
+          <a:p>
+            <a:r>
+              <a:rPr lang="en-US" dirty="0"/>
+              <a:t>ACKNOWLEDGMENTS</a:t>
+            </a:r>
+          </a:p>
+        </p:txBody>
+      </p:sp>
+      <p:sp>
+        <p:nvSpPr>
+          <p:cNvPr id="8" name="Content Placeholder 7">
+            <a:extLst>
+              <a:ext uri="{FF2B5EF4-FFF2-40B4-BE49-F238E27FC236}">
+                <a16:creationId xmlns:a16="http://schemas.microsoft.com/office/drawing/2014/main" id="{2BED3EB3-7E98-4A82-8335-7321D9E37B16}"/>
+              </a:ext>
+            </a:extLst>
+          </p:cNvPr>
+          <p:cNvSpPr>
+            <a:spLocks noGrp="1"/>
+          </p:cNvSpPr>
+          <p:nvPr>
+            <p:ph idx="1"/>
+          </p:nvPr>
+        </p:nvSpPr>
+        <p:spPr/>
+        <p:txBody>
+          <a:bodyPr/>
+          <a:lstStyle/>
+          <a:p>
+            <a:r>
+              <a:rPr lang="en-US" dirty="0"/>
+              <a:t>TensorFlow, the TensorFlow logo, and any related marks are trademarks of Google Inc.</a:t>
+            </a:r>
+          </a:p>
+        </p:txBody>
+      </p:sp>
+      <p:sp>
+        <p:nvSpPr>
+          <p:cNvPr id="4" name="Date Placeholder 3">
+            <a:extLst>
+              <a:ext uri="{FF2B5EF4-FFF2-40B4-BE49-F238E27FC236}">
+                <a16:creationId xmlns:a16="http://schemas.microsoft.com/office/drawing/2014/main" id="{540F37F1-4F33-429F-A568-1A3ADC499E54}"/>
+              </a:ext>
+            </a:extLst>
+          </p:cNvPr>
+          <p:cNvSpPr>
+            <a:spLocks noGrp="1"/>
+          </p:cNvSpPr>
+          <p:nvPr>
+            <p:ph type="dt" sz="half" idx="10"/>
+          </p:nvPr>
+        </p:nvSpPr>
+        <p:spPr/>
+        <p:txBody>
+          <a:bodyPr/>
+          <a:lstStyle/>
+          <a:p>
+            <a:fld id="{B08FEED8-D7D4-44E9-BFBC-ED06B5996D94}" type="datetime4">
+              <a:rPr lang="en-US" smtClean="0"/>
+              <a:t>October 28, 2019</a:t>
+            </a:fld>
+            <a:endParaRPr lang="en-US" dirty="0"/>
+          </a:p>
+        </p:txBody>
+      </p:sp>
+      <p:sp>
+        <p:nvSpPr>
+          <p:cNvPr id="5" name="Footer Placeholder 4">
+            <a:extLst>
+              <a:ext uri="{FF2B5EF4-FFF2-40B4-BE49-F238E27FC236}">
+                <a16:creationId xmlns:a16="http://schemas.microsoft.com/office/drawing/2014/main" id="{673FFA57-C126-4795-A5F6-DD33AAC5ACBD}"/>
+              </a:ext>
+            </a:extLst>
+          </p:cNvPr>
+          <p:cNvSpPr>
+            <a:spLocks noGrp="1"/>
+          </p:cNvSpPr>
+          <p:nvPr>
+            <p:ph type="ftr" sz="quarter" idx="11"/>
+          </p:nvPr>
+        </p:nvSpPr>
+        <p:spPr/>
+        <p:txBody>
+          <a:bodyPr/>
+          <a:lstStyle/>
+          <a:p>
+            <a:r>
+              <a:rPr lang="en-US"/>
+              <a:t>Digital Scholarship Services </a:t>
+            </a:r>
+            <a:r>
+              <a:rPr lang="en-US">
+                <a:solidFill>
+                  <a:schemeClr val="accent1">
+                    <a:lumMod val="50000"/>
+                  </a:schemeClr>
+                </a:solidFill>
+              </a:rPr>
+              <a:t>| Email</a:t>
+            </a:r>
+            <a:r>
+              <a:rPr lang="en-US"/>
+              <a:t> cf24@rice.edu </a:t>
+            </a:r>
+            <a:r>
+              <a:rPr lang="en-US">
+                <a:solidFill>
+                  <a:schemeClr val="accent1">
+                    <a:lumMod val="50000"/>
+                  </a:schemeClr>
+                </a:solidFill>
+              </a:rPr>
+              <a:t>|</a:t>
+            </a:r>
+            <a:r>
+              <a:rPr lang="en-US"/>
+              <a:t> library.rice.edu/dss</a:t>
+            </a:r>
+            <a:endParaRPr lang="en-US" dirty="0"/>
+          </a:p>
+        </p:txBody>
+      </p:sp>
+      <p:sp>
+        <p:nvSpPr>
+          <p:cNvPr id="6" name="Slide Number Placeholder 5">
+            <a:extLst>
+              <a:ext uri="{FF2B5EF4-FFF2-40B4-BE49-F238E27FC236}">
+                <a16:creationId xmlns:a16="http://schemas.microsoft.com/office/drawing/2014/main" id="{2FA49567-BB70-4798-8746-D0B522CCEE20}"/>
+              </a:ext>
+            </a:extLst>
+          </p:cNvPr>
+          <p:cNvSpPr>
+            <a:spLocks noGrp="1"/>
+          </p:cNvSpPr>
+          <p:nvPr>
+            <p:ph type="sldNum" sz="quarter" idx="12"/>
+          </p:nvPr>
+        </p:nvSpPr>
+        <p:spPr/>
+        <p:txBody>
+          <a:bodyPr/>
+          <a:lstStyle/>
+          <a:p>
+            <a:fld id="{D57F1E4F-1CFF-5643-939E-02111984F565}" type="slidenum">
+              <a:rPr lang="en-US" smtClean="0"/>
+              <a:t>13</a:t>
+            </a:fld>
+            <a:endParaRPr lang="en-US" dirty="0"/>
+          </a:p>
+        </p:txBody>
+      </p:sp>
+    </p:spTree>
+    <p:extLst>
+      <p:ext uri="{BB962C8B-B14F-4D97-AF65-F5344CB8AC3E}">
+        <p14:creationId xmlns:p14="http://schemas.microsoft.com/office/powerpoint/2010/main" val="1585568494"/>
+      </p:ext>
+    </p:extLst>
+  </p:cSld>
+  <p:clrMapOvr>
+    <a:masterClrMapping/>
+  </p:clrMapOvr>
+</p:sld>
+</file>
+
 <file path=ppt/slides/slide2.xml><?xml version="1.0" encoding="utf-8"?>
 <p:sld xmlns:a="http://schemas.openxmlformats.org/drawingml/2006/main" xmlns:r="http://schemas.openxmlformats.org/officeDocument/2006/relationships" xmlns:p="http://schemas.openxmlformats.org/presentationml/2006/main">
   <p:cSld>
@@ -3824,13 +4256,7 @@
       </p:grpSpPr>
       <p:sp>
         <p:nvSpPr>
-          <p:cNvPr id="7" name="Title 6">
-            <a:extLst>
-              <a:ext uri="{FF2B5EF4-FFF2-40B4-BE49-F238E27FC236}">
-                <a16:creationId xmlns:a16="http://schemas.microsoft.com/office/drawing/2014/main" id="{495B4BC0-844B-4414-A623-BEF78AAC1BA1}"/>
-              </a:ext>
-            </a:extLst>
-          </p:cNvPr>
+          <p:cNvPr id="4" name="Title 3"/>
           <p:cNvSpPr>
             <a:spLocks noGrp="1"/>
           </p:cNvSpPr>
@@ -3844,21 +4270,16 @@
           <a:lstStyle/>
           <a:p>
             <a:r>
-              <a:rPr lang="en-US" dirty="0"/>
-              <a:t>ACKNOWLEDGMENTS</a:t>
-            </a:r>
-          </a:p>
-        </p:txBody>
-      </p:sp>
-      <p:sp>
-        <p:nvSpPr>
-          <p:cNvPr id="8" name="Content Placeholder 7">
-            <a:extLst>
-              <a:ext uri="{FF2B5EF4-FFF2-40B4-BE49-F238E27FC236}">
-                <a16:creationId xmlns:a16="http://schemas.microsoft.com/office/drawing/2014/main" id="{2BED3EB3-7E98-4A82-8335-7321D9E37B16}"/>
-              </a:ext>
-            </a:extLst>
-          </p:cNvPr>
+              <a:rPr lang="en-US" dirty="0" smtClean="0"/>
+              <a:t>ABOUT TENSORFLOW</a:t>
+            </a:r>
+            <a:endParaRPr lang="en-US" dirty="0"/>
+          </a:p>
+        </p:txBody>
+      </p:sp>
+      <p:sp>
+        <p:nvSpPr>
+          <p:cNvPr id="5" name="Content Placeholder 4"/>
           <p:cNvSpPr>
             <a:spLocks noGrp="1"/>
           </p:cNvSpPr>
@@ -3871,22 +4292,96 @@
           <a:bodyPr/>
           <a:lstStyle/>
           <a:p>
-            <a:r>
-              <a:rPr lang="en-US" dirty="0"/>
-              <a:t>TensorFlow, the TensorFlow logo, and any related marks are trademarks of Google Inc.</a:t>
-            </a:r>
-          </a:p>
-        </p:txBody>
-      </p:sp>
-      <p:sp>
-        <p:nvSpPr>
-          <p:cNvPr id="4" name="Date Placeholder 3">
-            <a:extLst>
-              <a:ext uri="{FF2B5EF4-FFF2-40B4-BE49-F238E27FC236}">
-                <a16:creationId xmlns:a16="http://schemas.microsoft.com/office/drawing/2014/main" id="{540F37F1-4F33-429F-A568-1A3ADC499E54}"/>
-              </a:ext>
-            </a:extLst>
-          </p:cNvPr>
+            <a:endParaRPr lang="en-US" dirty="0"/>
+          </a:p>
+        </p:txBody>
+      </p:sp>
+    </p:spTree>
+    <p:extLst>
+      <p:ext uri="{BB962C8B-B14F-4D97-AF65-F5344CB8AC3E}">
+        <p14:creationId xmlns:p14="http://schemas.microsoft.com/office/powerpoint/2010/main" val="1975586487"/>
+      </p:ext>
+    </p:extLst>
+  </p:cSld>
+  <p:clrMapOvr>
+    <a:masterClrMapping/>
+  </p:clrMapOvr>
+</p:sld>
+</file>
+
+<file path=ppt/slides/slide3.xml><?xml version="1.0" encoding="utf-8"?>
+<p:sld xmlns:a="http://schemas.openxmlformats.org/drawingml/2006/main" xmlns:r="http://schemas.openxmlformats.org/officeDocument/2006/relationships" xmlns:p="http://schemas.openxmlformats.org/presentationml/2006/main">
+  <p:cSld>
+    <p:spTree>
+      <p:nvGrpSpPr>
+        <p:cNvPr id="1" name=""/>
+        <p:cNvGrpSpPr/>
+        <p:nvPr/>
+      </p:nvGrpSpPr>
+      <p:grpSpPr>
+        <a:xfrm>
+          <a:off x="0" y="0"/>
+          <a:ext cx="0" cy="0"/>
+          <a:chOff x="0" y="0"/>
+          <a:chExt cx="0" cy="0"/>
+        </a:xfrm>
+      </p:grpSpPr>
+      <p:sp>
+        <p:nvSpPr>
+          <p:cNvPr id="7" name="Title 6"/>
+          <p:cNvSpPr>
+            <a:spLocks noGrp="1"/>
+          </p:cNvSpPr>
+          <p:nvPr>
+            <p:ph type="title"/>
+          </p:nvPr>
+        </p:nvSpPr>
+        <p:spPr/>
+        <p:txBody>
+          <a:bodyPr/>
+          <a:lstStyle/>
+          <a:p>
+            <a:r>
+              <a:rPr lang="en-US" dirty="0" smtClean="0"/>
+              <a:t>WHAT IS</a:t>
+            </a:r>
+            <a:br>
+              <a:rPr lang="en-US" dirty="0" smtClean="0"/>
+            </a:br>
+            <a:r>
+              <a:rPr lang="en-US" dirty="0" smtClean="0"/>
+              <a:t>MACHINE LEARNING?</a:t>
+            </a:r>
+            <a:endParaRPr lang="en-US" dirty="0"/>
+          </a:p>
+        </p:txBody>
+      </p:sp>
+      <p:sp>
+        <p:nvSpPr>
+          <p:cNvPr id="8" name="Text Placeholder 7"/>
+          <p:cNvSpPr>
+            <a:spLocks noGrp="1"/>
+          </p:cNvSpPr>
+          <p:nvPr>
+            <p:ph type="body" idx="1"/>
+          </p:nvPr>
+        </p:nvSpPr>
+        <p:spPr/>
+        <p:txBody>
+          <a:bodyPr/>
+          <a:lstStyle/>
+          <a:p>
+            <a:r>
+              <a:rPr lang="en-US" dirty="0" smtClean="0"/>
+              <a:t>Regression, Classification, Artificial Intelligence, Reinforcement Learning</a:t>
+            </a:r>
+            <a:endParaRPr lang="en-US" dirty="0"/>
+          </a:p>
+        </p:txBody>
+      </p:sp>
+      <p:sp>
+        <p:nvSpPr>
+          <p:cNvPr id="4" name="Date Placeholder 3"/>
           <p:cNvSpPr>
             <a:spLocks noGrp="1"/>
           </p:cNvSpPr>
@@ -3899,9 +4394,9 @@
           <a:bodyPr/>
           <a:lstStyle/>
           <a:p>
-            <a:fld id="{B08FEED8-D7D4-44E9-BFBC-ED06B5996D94}" type="datetime4">
+            <a:fld id="{8AAE40A0-A7D8-4DC3-BC9E-BADA32DA2004}" type="datetime4">
               <a:rPr lang="en-US" smtClean="0"/>
-              <a:t>August 7, 2019</a:t>
+              <a:t>October 28, 2019</a:t>
             </a:fld>
             <a:endParaRPr lang="en-US" dirty="0"/>
           </a:p>
@@ -3909,13 +4404,7 @@
       </p:sp>
       <p:sp>
         <p:nvSpPr>
-          <p:cNvPr id="5" name="Footer Placeholder 4">
-            <a:extLst>
-              <a:ext uri="{FF2B5EF4-FFF2-40B4-BE49-F238E27FC236}">
-                <a16:creationId xmlns:a16="http://schemas.microsoft.com/office/drawing/2014/main" id="{673FFA57-C126-4795-A5F6-DD33AAC5ACBD}"/>
-              </a:ext>
-            </a:extLst>
-          </p:cNvPr>
+          <p:cNvPr id="5" name="Footer Placeholder 4"/>
           <p:cNvSpPr>
             <a:spLocks noGrp="1"/>
           </p:cNvSpPr>
@@ -3929,11 +4418,11 @@
           <a:lstStyle/>
           <a:p>
             <a:r>
-              <a:rPr lang="en-US"/>
+              <a:rPr lang="en-US" smtClean="0"/>
               <a:t>Digital Scholarship Services </a:t>
             </a:r>
             <a:r>
-              <a:rPr lang="en-US">
+              <a:rPr lang="en-US" smtClean="0">
                 <a:solidFill>
                   <a:schemeClr val="accent1">
                     <a:lumMod val="50000"/>
@@ -3943,11 +4432,11 @@
               <a:t>| Email</a:t>
             </a:r>
             <a:r>
-              <a:rPr lang="en-US"/>
+              <a:rPr lang="en-US" smtClean="0"/>
               <a:t> cf24@rice.edu </a:t>
             </a:r>
             <a:r>
-              <a:rPr lang="en-US">
+              <a:rPr lang="en-US" smtClean="0">
                 <a:solidFill>
                   <a:schemeClr val="accent1">
                     <a:lumMod val="50000"/>
@@ -3957,7 +4446,7 @@
               <a:t>|</a:t>
             </a:r>
             <a:r>
-              <a:rPr lang="en-US"/>
+              <a:rPr lang="en-US" smtClean="0"/>
               <a:t> library.rice.edu/dss</a:t>
             </a:r>
             <a:endParaRPr lang="en-US" dirty="0"/>
@@ -3966,13 +4455,7 @@
       </p:sp>
       <p:sp>
         <p:nvSpPr>
-          <p:cNvPr id="6" name="Slide Number Placeholder 5">
-            <a:extLst>
-              <a:ext uri="{FF2B5EF4-FFF2-40B4-BE49-F238E27FC236}">
-                <a16:creationId xmlns:a16="http://schemas.microsoft.com/office/drawing/2014/main" id="{2FA49567-BB70-4798-8746-D0B522CCEE20}"/>
-              </a:ext>
-            </a:extLst>
-          </p:cNvPr>
+          <p:cNvPr id="6" name="Slide Number Placeholder 5"/>
           <p:cNvSpPr>
             <a:spLocks noGrp="1"/>
           </p:cNvSpPr>
@@ -3987,7 +4470,7 @@
           <a:p>
             <a:fld id="{D57F1E4F-1CFF-5643-939E-02111984F565}" type="slidenum">
               <a:rPr lang="en-US" smtClean="0"/>
-              <a:t>2</a:t>
+              <a:t>3</a:t>
             </a:fld>
             <a:endParaRPr lang="en-US" dirty="0"/>
           </a:p>
@@ -3996,7 +4479,951 @@
     </p:spTree>
     <p:extLst>
       <p:ext uri="{BB962C8B-B14F-4D97-AF65-F5344CB8AC3E}">
-        <p14:creationId xmlns:p14="http://schemas.microsoft.com/office/powerpoint/2010/main" val="1585568494"/>
+        <p14:creationId xmlns:p14="http://schemas.microsoft.com/office/powerpoint/2010/main" val="2634181450"/>
+      </p:ext>
+    </p:extLst>
+  </p:cSld>
+  <p:clrMapOvr>
+    <a:masterClrMapping/>
+  </p:clrMapOvr>
+</p:sld>
+</file>
+
+<file path=ppt/slides/slide4.xml><?xml version="1.0" encoding="utf-8"?>
+<p:sld xmlns:a="http://schemas.openxmlformats.org/drawingml/2006/main" xmlns:r="http://schemas.openxmlformats.org/officeDocument/2006/relationships" xmlns:p="http://schemas.openxmlformats.org/presentationml/2006/main">
+  <p:cSld>
+    <p:spTree>
+      <p:nvGrpSpPr>
+        <p:cNvPr id="1" name=""/>
+        <p:cNvGrpSpPr/>
+        <p:nvPr/>
+      </p:nvGrpSpPr>
+      <p:grpSpPr>
+        <a:xfrm>
+          <a:off x="0" y="0"/>
+          <a:ext cx="0" cy="0"/>
+          <a:chOff x="0" y="0"/>
+          <a:chExt cx="0" cy="0"/>
+        </a:xfrm>
+      </p:grpSpPr>
+      <p:sp>
+        <p:nvSpPr>
+          <p:cNvPr id="7" name="Title 6"/>
+          <p:cNvSpPr>
+            <a:spLocks noGrp="1"/>
+          </p:cNvSpPr>
+          <p:nvPr>
+            <p:ph type="title"/>
+          </p:nvPr>
+        </p:nvSpPr>
+        <p:spPr/>
+        <p:txBody>
+          <a:bodyPr/>
+          <a:lstStyle/>
+          <a:p>
+            <a:r>
+              <a:rPr lang="en-US" dirty="0" smtClean="0"/>
+              <a:t>LINEAR REGRESSION</a:t>
+            </a:r>
+            <a:endParaRPr lang="en-US" dirty="0"/>
+          </a:p>
+        </p:txBody>
+      </p:sp>
+      <p:sp>
+        <p:nvSpPr>
+          <p:cNvPr id="8" name="Text Placeholder 7"/>
+          <p:cNvSpPr>
+            <a:spLocks noGrp="1"/>
+          </p:cNvSpPr>
+          <p:nvPr>
+            <p:ph type="body" idx="1"/>
+          </p:nvPr>
+        </p:nvSpPr>
+        <p:spPr/>
+        <p:txBody>
+          <a:bodyPr/>
+          <a:lstStyle/>
+          <a:p>
+            <a:r>
+              <a:rPr lang="en-US" dirty="0" smtClean="0"/>
+              <a:t>Simple Modeling</a:t>
+            </a:r>
+            <a:endParaRPr lang="en-US" dirty="0"/>
+          </a:p>
+        </p:txBody>
+      </p:sp>
+      <p:sp>
+        <p:nvSpPr>
+          <p:cNvPr id="4" name="Date Placeholder 3"/>
+          <p:cNvSpPr>
+            <a:spLocks noGrp="1"/>
+          </p:cNvSpPr>
+          <p:nvPr>
+            <p:ph type="dt" sz="half" idx="10"/>
+          </p:nvPr>
+        </p:nvSpPr>
+        <p:spPr/>
+        <p:txBody>
+          <a:bodyPr/>
+          <a:lstStyle/>
+          <a:p>
+            <a:fld id="{8AAE40A0-A7D8-4DC3-BC9E-BADA32DA2004}" type="datetime4">
+              <a:rPr lang="en-US" smtClean="0"/>
+              <a:t>October 28, 2019</a:t>
+            </a:fld>
+            <a:endParaRPr lang="en-US" dirty="0"/>
+          </a:p>
+        </p:txBody>
+      </p:sp>
+      <p:sp>
+        <p:nvSpPr>
+          <p:cNvPr id="5" name="Footer Placeholder 4"/>
+          <p:cNvSpPr>
+            <a:spLocks noGrp="1"/>
+          </p:cNvSpPr>
+          <p:nvPr>
+            <p:ph type="ftr" sz="quarter" idx="11"/>
+          </p:nvPr>
+        </p:nvSpPr>
+        <p:spPr/>
+        <p:txBody>
+          <a:bodyPr/>
+          <a:lstStyle/>
+          <a:p>
+            <a:r>
+              <a:rPr lang="en-US" smtClean="0"/>
+              <a:t>Digital Scholarship Services </a:t>
+            </a:r>
+            <a:r>
+              <a:rPr lang="en-US" smtClean="0">
+                <a:solidFill>
+                  <a:schemeClr val="accent1">
+                    <a:lumMod val="50000"/>
+                  </a:schemeClr>
+                </a:solidFill>
+              </a:rPr>
+              <a:t>| Email</a:t>
+            </a:r>
+            <a:r>
+              <a:rPr lang="en-US" smtClean="0"/>
+              <a:t> cf24@rice.edu </a:t>
+            </a:r>
+            <a:r>
+              <a:rPr lang="en-US" smtClean="0">
+                <a:solidFill>
+                  <a:schemeClr val="accent1">
+                    <a:lumMod val="50000"/>
+                  </a:schemeClr>
+                </a:solidFill>
+              </a:rPr>
+              <a:t>|</a:t>
+            </a:r>
+            <a:r>
+              <a:rPr lang="en-US" smtClean="0"/>
+              <a:t> library.rice.edu/dss</a:t>
+            </a:r>
+            <a:endParaRPr lang="en-US" dirty="0"/>
+          </a:p>
+        </p:txBody>
+      </p:sp>
+      <p:sp>
+        <p:nvSpPr>
+          <p:cNvPr id="6" name="Slide Number Placeholder 5"/>
+          <p:cNvSpPr>
+            <a:spLocks noGrp="1"/>
+          </p:cNvSpPr>
+          <p:nvPr>
+            <p:ph type="sldNum" sz="quarter" idx="12"/>
+          </p:nvPr>
+        </p:nvSpPr>
+        <p:spPr/>
+        <p:txBody>
+          <a:bodyPr/>
+          <a:lstStyle/>
+          <a:p>
+            <a:fld id="{D57F1E4F-1CFF-5643-939E-02111984F565}" type="slidenum">
+              <a:rPr lang="en-US" smtClean="0"/>
+              <a:t>4</a:t>
+            </a:fld>
+            <a:endParaRPr lang="en-US" dirty="0"/>
+          </a:p>
+        </p:txBody>
+      </p:sp>
+    </p:spTree>
+    <p:extLst>
+      <p:ext uri="{BB962C8B-B14F-4D97-AF65-F5344CB8AC3E}">
+        <p14:creationId xmlns:p14="http://schemas.microsoft.com/office/powerpoint/2010/main" val="2415813672"/>
+      </p:ext>
+    </p:extLst>
+  </p:cSld>
+  <p:clrMapOvr>
+    <a:masterClrMapping/>
+  </p:clrMapOvr>
+</p:sld>
+</file>
+
+<file path=ppt/slides/slide5.xml><?xml version="1.0" encoding="utf-8"?>
+<p:sld xmlns:a="http://schemas.openxmlformats.org/drawingml/2006/main" xmlns:r="http://schemas.openxmlformats.org/officeDocument/2006/relationships" xmlns:p="http://schemas.openxmlformats.org/presentationml/2006/main">
+  <p:cSld>
+    <p:spTree>
+      <p:nvGrpSpPr>
+        <p:cNvPr id="1" name=""/>
+        <p:cNvGrpSpPr/>
+        <p:nvPr/>
+      </p:nvGrpSpPr>
+      <p:grpSpPr>
+        <a:xfrm>
+          <a:off x="0" y="0"/>
+          <a:ext cx="0" cy="0"/>
+          <a:chOff x="0" y="0"/>
+          <a:chExt cx="0" cy="0"/>
+        </a:xfrm>
+      </p:grpSpPr>
+      <p:sp>
+        <p:nvSpPr>
+          <p:cNvPr id="7" name="Title 6"/>
+          <p:cNvSpPr>
+            <a:spLocks noGrp="1"/>
+          </p:cNvSpPr>
+          <p:nvPr>
+            <p:ph type="title"/>
+          </p:nvPr>
+        </p:nvSpPr>
+        <p:spPr/>
+        <p:txBody>
+          <a:bodyPr/>
+          <a:lstStyle/>
+          <a:p>
+            <a:r>
+              <a:rPr lang="en-US" dirty="0" smtClean="0"/>
+              <a:t>LOGISTIC REGRESSION</a:t>
+            </a:r>
+            <a:endParaRPr lang="en-US" dirty="0"/>
+          </a:p>
+        </p:txBody>
+      </p:sp>
+      <p:sp>
+        <p:nvSpPr>
+          <p:cNvPr id="8" name="Text Placeholder 7"/>
+          <p:cNvSpPr>
+            <a:spLocks noGrp="1"/>
+          </p:cNvSpPr>
+          <p:nvPr>
+            <p:ph type="body" idx="1"/>
+          </p:nvPr>
+        </p:nvSpPr>
+        <p:spPr/>
+        <p:txBody>
+          <a:bodyPr/>
+          <a:lstStyle/>
+          <a:p>
+            <a:r>
+              <a:rPr lang="en-US" dirty="0" smtClean="0"/>
+              <a:t>Not regression at all! Simple classification</a:t>
+            </a:r>
+            <a:endParaRPr lang="en-US" dirty="0"/>
+          </a:p>
+        </p:txBody>
+      </p:sp>
+      <p:sp>
+        <p:nvSpPr>
+          <p:cNvPr id="4" name="Date Placeholder 3"/>
+          <p:cNvSpPr>
+            <a:spLocks noGrp="1"/>
+          </p:cNvSpPr>
+          <p:nvPr>
+            <p:ph type="dt" sz="half" idx="10"/>
+          </p:nvPr>
+        </p:nvSpPr>
+        <p:spPr/>
+        <p:txBody>
+          <a:bodyPr/>
+          <a:lstStyle/>
+          <a:p>
+            <a:fld id="{8AAE40A0-A7D8-4DC3-BC9E-BADA32DA2004}" type="datetime4">
+              <a:rPr lang="en-US" smtClean="0"/>
+              <a:t>October 28, 2019</a:t>
+            </a:fld>
+            <a:endParaRPr lang="en-US" dirty="0"/>
+          </a:p>
+        </p:txBody>
+      </p:sp>
+      <p:sp>
+        <p:nvSpPr>
+          <p:cNvPr id="5" name="Footer Placeholder 4"/>
+          <p:cNvSpPr>
+            <a:spLocks noGrp="1"/>
+          </p:cNvSpPr>
+          <p:nvPr>
+            <p:ph type="ftr" sz="quarter" idx="11"/>
+          </p:nvPr>
+        </p:nvSpPr>
+        <p:spPr/>
+        <p:txBody>
+          <a:bodyPr/>
+          <a:lstStyle/>
+          <a:p>
+            <a:r>
+              <a:rPr lang="en-US" smtClean="0"/>
+              <a:t>Digital Scholarship Services </a:t>
+            </a:r>
+            <a:r>
+              <a:rPr lang="en-US" smtClean="0">
+                <a:solidFill>
+                  <a:schemeClr val="accent1">
+                    <a:lumMod val="50000"/>
+                  </a:schemeClr>
+                </a:solidFill>
+              </a:rPr>
+              <a:t>| Email</a:t>
+            </a:r>
+            <a:r>
+              <a:rPr lang="en-US" smtClean="0"/>
+              <a:t> cf24@rice.edu </a:t>
+            </a:r>
+            <a:r>
+              <a:rPr lang="en-US" smtClean="0">
+                <a:solidFill>
+                  <a:schemeClr val="accent1">
+                    <a:lumMod val="50000"/>
+                  </a:schemeClr>
+                </a:solidFill>
+              </a:rPr>
+              <a:t>|</a:t>
+            </a:r>
+            <a:r>
+              <a:rPr lang="en-US" smtClean="0"/>
+              <a:t> library.rice.edu/dss</a:t>
+            </a:r>
+            <a:endParaRPr lang="en-US" dirty="0"/>
+          </a:p>
+        </p:txBody>
+      </p:sp>
+      <p:sp>
+        <p:nvSpPr>
+          <p:cNvPr id="6" name="Slide Number Placeholder 5"/>
+          <p:cNvSpPr>
+            <a:spLocks noGrp="1"/>
+          </p:cNvSpPr>
+          <p:nvPr>
+            <p:ph type="sldNum" sz="quarter" idx="12"/>
+          </p:nvPr>
+        </p:nvSpPr>
+        <p:spPr/>
+        <p:txBody>
+          <a:bodyPr/>
+          <a:lstStyle/>
+          <a:p>
+            <a:fld id="{D57F1E4F-1CFF-5643-939E-02111984F565}" type="slidenum">
+              <a:rPr lang="en-US" smtClean="0"/>
+              <a:t>5</a:t>
+            </a:fld>
+            <a:endParaRPr lang="en-US" dirty="0"/>
+          </a:p>
+        </p:txBody>
+      </p:sp>
+    </p:spTree>
+    <p:extLst>
+      <p:ext uri="{BB962C8B-B14F-4D97-AF65-F5344CB8AC3E}">
+        <p14:creationId xmlns:p14="http://schemas.microsoft.com/office/powerpoint/2010/main" val="1100806539"/>
+      </p:ext>
+    </p:extLst>
+  </p:cSld>
+  <p:clrMapOvr>
+    <a:masterClrMapping/>
+  </p:clrMapOvr>
+</p:sld>
+</file>
+
+<file path=ppt/slides/slide6.xml><?xml version="1.0" encoding="utf-8"?>
+<p:sld xmlns:a="http://schemas.openxmlformats.org/drawingml/2006/main" xmlns:r="http://schemas.openxmlformats.org/officeDocument/2006/relationships" xmlns:p="http://schemas.openxmlformats.org/presentationml/2006/main">
+  <p:cSld>
+    <p:spTree>
+      <p:nvGrpSpPr>
+        <p:cNvPr id="1" name=""/>
+        <p:cNvGrpSpPr/>
+        <p:nvPr/>
+      </p:nvGrpSpPr>
+      <p:grpSpPr>
+        <a:xfrm>
+          <a:off x="0" y="0"/>
+          <a:ext cx="0" cy="0"/>
+          <a:chOff x="0" y="0"/>
+          <a:chExt cx="0" cy="0"/>
+        </a:xfrm>
+      </p:grpSpPr>
+      <p:sp>
+        <p:nvSpPr>
+          <p:cNvPr id="7" name="Title 6"/>
+          <p:cNvSpPr>
+            <a:spLocks noGrp="1"/>
+          </p:cNvSpPr>
+          <p:nvPr>
+            <p:ph type="title"/>
+          </p:nvPr>
+        </p:nvSpPr>
+        <p:spPr/>
+        <p:txBody>
+          <a:bodyPr/>
+          <a:lstStyle/>
+          <a:p>
+            <a:r>
+              <a:rPr lang="en-US" dirty="0" smtClean="0"/>
+              <a:t>NEURAL NETWORKS</a:t>
+            </a:r>
+            <a:br>
+              <a:rPr lang="en-US" dirty="0" smtClean="0"/>
+            </a:br>
+            <a:r>
+              <a:rPr lang="en-US" dirty="0" smtClean="0"/>
+              <a:t>&amp; CONVOLUTION</a:t>
+            </a:r>
+            <a:endParaRPr lang="en-US" dirty="0"/>
+          </a:p>
+        </p:txBody>
+      </p:sp>
+      <p:sp>
+        <p:nvSpPr>
+          <p:cNvPr id="8" name="Text Placeholder 7"/>
+          <p:cNvSpPr>
+            <a:spLocks noGrp="1"/>
+          </p:cNvSpPr>
+          <p:nvPr>
+            <p:ph type="body" idx="1"/>
+          </p:nvPr>
+        </p:nvSpPr>
+        <p:spPr/>
+        <p:txBody>
+          <a:bodyPr/>
+          <a:lstStyle/>
+          <a:p>
+            <a:r>
+              <a:rPr lang="en-US" dirty="0" smtClean="0"/>
+              <a:t>More flexible, more costly to train and use</a:t>
+            </a:r>
+            <a:endParaRPr lang="en-US" dirty="0"/>
+          </a:p>
+        </p:txBody>
+      </p:sp>
+      <p:sp>
+        <p:nvSpPr>
+          <p:cNvPr id="4" name="Date Placeholder 3"/>
+          <p:cNvSpPr>
+            <a:spLocks noGrp="1"/>
+          </p:cNvSpPr>
+          <p:nvPr>
+            <p:ph type="dt" sz="half" idx="10"/>
+          </p:nvPr>
+        </p:nvSpPr>
+        <p:spPr/>
+        <p:txBody>
+          <a:bodyPr/>
+          <a:lstStyle/>
+          <a:p>
+            <a:fld id="{8AAE40A0-A7D8-4DC3-BC9E-BADA32DA2004}" type="datetime4">
+              <a:rPr lang="en-US" smtClean="0"/>
+              <a:t>October 28, 2019</a:t>
+            </a:fld>
+            <a:endParaRPr lang="en-US" dirty="0"/>
+          </a:p>
+        </p:txBody>
+      </p:sp>
+      <p:sp>
+        <p:nvSpPr>
+          <p:cNvPr id="5" name="Footer Placeholder 4"/>
+          <p:cNvSpPr>
+            <a:spLocks noGrp="1"/>
+          </p:cNvSpPr>
+          <p:nvPr>
+            <p:ph type="ftr" sz="quarter" idx="11"/>
+          </p:nvPr>
+        </p:nvSpPr>
+        <p:spPr/>
+        <p:txBody>
+          <a:bodyPr/>
+          <a:lstStyle/>
+          <a:p>
+            <a:r>
+              <a:rPr lang="en-US" smtClean="0"/>
+              <a:t>Digital Scholarship Services </a:t>
+            </a:r>
+            <a:r>
+              <a:rPr lang="en-US" smtClean="0">
+                <a:solidFill>
+                  <a:schemeClr val="accent1">
+                    <a:lumMod val="50000"/>
+                  </a:schemeClr>
+                </a:solidFill>
+              </a:rPr>
+              <a:t>| Email</a:t>
+            </a:r>
+            <a:r>
+              <a:rPr lang="en-US" smtClean="0"/>
+              <a:t> cf24@rice.edu </a:t>
+            </a:r>
+            <a:r>
+              <a:rPr lang="en-US" smtClean="0">
+                <a:solidFill>
+                  <a:schemeClr val="accent1">
+                    <a:lumMod val="50000"/>
+                  </a:schemeClr>
+                </a:solidFill>
+              </a:rPr>
+              <a:t>|</a:t>
+            </a:r>
+            <a:r>
+              <a:rPr lang="en-US" smtClean="0"/>
+              <a:t> library.rice.edu/dss</a:t>
+            </a:r>
+            <a:endParaRPr lang="en-US" dirty="0"/>
+          </a:p>
+        </p:txBody>
+      </p:sp>
+      <p:sp>
+        <p:nvSpPr>
+          <p:cNvPr id="6" name="Slide Number Placeholder 5"/>
+          <p:cNvSpPr>
+            <a:spLocks noGrp="1"/>
+          </p:cNvSpPr>
+          <p:nvPr>
+            <p:ph type="sldNum" sz="quarter" idx="12"/>
+          </p:nvPr>
+        </p:nvSpPr>
+        <p:spPr/>
+        <p:txBody>
+          <a:bodyPr/>
+          <a:lstStyle/>
+          <a:p>
+            <a:fld id="{D57F1E4F-1CFF-5643-939E-02111984F565}" type="slidenum">
+              <a:rPr lang="en-US" smtClean="0"/>
+              <a:t>6</a:t>
+            </a:fld>
+            <a:endParaRPr lang="en-US" dirty="0"/>
+          </a:p>
+        </p:txBody>
+      </p:sp>
+    </p:spTree>
+    <p:extLst>
+      <p:ext uri="{BB962C8B-B14F-4D97-AF65-F5344CB8AC3E}">
+        <p14:creationId xmlns:p14="http://schemas.microsoft.com/office/powerpoint/2010/main" val="2033922517"/>
+      </p:ext>
+    </p:extLst>
+  </p:cSld>
+  <p:clrMapOvr>
+    <a:masterClrMapping/>
+  </p:clrMapOvr>
+</p:sld>
+</file>
+
+<file path=ppt/slides/slide7.xml><?xml version="1.0" encoding="utf-8"?>
+<p:sld xmlns:a="http://schemas.openxmlformats.org/drawingml/2006/main" xmlns:r="http://schemas.openxmlformats.org/officeDocument/2006/relationships" xmlns:p="http://schemas.openxmlformats.org/presentationml/2006/main">
+  <p:cSld>
+    <p:spTree>
+      <p:nvGrpSpPr>
+        <p:cNvPr id="1" name=""/>
+        <p:cNvGrpSpPr/>
+        <p:nvPr/>
+      </p:nvGrpSpPr>
+      <p:grpSpPr>
+        <a:xfrm>
+          <a:off x="0" y="0"/>
+          <a:ext cx="0" cy="0"/>
+          <a:chOff x="0" y="0"/>
+          <a:chExt cx="0" cy="0"/>
+        </a:xfrm>
+      </p:grpSpPr>
+      <p:sp>
+        <p:nvSpPr>
+          <p:cNvPr id="7" name="Title 6"/>
+          <p:cNvSpPr>
+            <a:spLocks noGrp="1"/>
+          </p:cNvSpPr>
+          <p:nvPr>
+            <p:ph type="title"/>
+          </p:nvPr>
+        </p:nvSpPr>
+        <p:spPr/>
+        <p:txBody>
+          <a:bodyPr/>
+          <a:lstStyle/>
+          <a:p>
+            <a:r>
+              <a:rPr lang="en-US" dirty="0" smtClean="0"/>
+              <a:t>ARTIFICIAL INTELLIGENCE</a:t>
+            </a:r>
+            <a:endParaRPr lang="en-US" dirty="0"/>
+          </a:p>
+        </p:txBody>
+      </p:sp>
+      <p:sp>
+        <p:nvSpPr>
+          <p:cNvPr id="8" name="Text Placeholder 7"/>
+          <p:cNvSpPr>
+            <a:spLocks noGrp="1"/>
+          </p:cNvSpPr>
+          <p:nvPr>
+            <p:ph type="body" idx="1"/>
+          </p:nvPr>
+        </p:nvSpPr>
+        <p:spPr/>
+        <p:txBody>
+          <a:bodyPr/>
+          <a:lstStyle/>
+          <a:p>
+            <a:r>
+              <a:rPr lang="en-US" dirty="0" smtClean="0"/>
+              <a:t>How intelligent is it?</a:t>
+            </a:r>
+            <a:endParaRPr lang="en-US" dirty="0"/>
+          </a:p>
+        </p:txBody>
+      </p:sp>
+      <p:sp>
+        <p:nvSpPr>
+          <p:cNvPr id="4" name="Date Placeholder 3"/>
+          <p:cNvSpPr>
+            <a:spLocks noGrp="1"/>
+          </p:cNvSpPr>
+          <p:nvPr>
+            <p:ph type="dt" sz="half" idx="10"/>
+          </p:nvPr>
+        </p:nvSpPr>
+        <p:spPr/>
+        <p:txBody>
+          <a:bodyPr/>
+          <a:lstStyle/>
+          <a:p>
+            <a:fld id="{8AAE40A0-A7D8-4DC3-BC9E-BADA32DA2004}" type="datetime4">
+              <a:rPr lang="en-US" smtClean="0"/>
+              <a:t>October 28, 2019</a:t>
+            </a:fld>
+            <a:endParaRPr lang="en-US" dirty="0"/>
+          </a:p>
+        </p:txBody>
+      </p:sp>
+      <p:sp>
+        <p:nvSpPr>
+          <p:cNvPr id="5" name="Footer Placeholder 4"/>
+          <p:cNvSpPr>
+            <a:spLocks noGrp="1"/>
+          </p:cNvSpPr>
+          <p:nvPr>
+            <p:ph type="ftr" sz="quarter" idx="11"/>
+          </p:nvPr>
+        </p:nvSpPr>
+        <p:spPr/>
+        <p:txBody>
+          <a:bodyPr/>
+          <a:lstStyle/>
+          <a:p>
+            <a:r>
+              <a:rPr lang="en-US" smtClean="0"/>
+              <a:t>Digital Scholarship Services </a:t>
+            </a:r>
+            <a:r>
+              <a:rPr lang="en-US" smtClean="0">
+                <a:solidFill>
+                  <a:schemeClr val="accent1">
+                    <a:lumMod val="50000"/>
+                  </a:schemeClr>
+                </a:solidFill>
+              </a:rPr>
+              <a:t>| Email</a:t>
+            </a:r>
+            <a:r>
+              <a:rPr lang="en-US" smtClean="0"/>
+              <a:t> cf24@rice.edu </a:t>
+            </a:r>
+            <a:r>
+              <a:rPr lang="en-US" smtClean="0">
+                <a:solidFill>
+                  <a:schemeClr val="accent1">
+                    <a:lumMod val="50000"/>
+                  </a:schemeClr>
+                </a:solidFill>
+              </a:rPr>
+              <a:t>|</a:t>
+            </a:r>
+            <a:r>
+              <a:rPr lang="en-US" smtClean="0"/>
+              <a:t> library.rice.edu/dss</a:t>
+            </a:r>
+            <a:endParaRPr lang="en-US" dirty="0"/>
+          </a:p>
+        </p:txBody>
+      </p:sp>
+      <p:sp>
+        <p:nvSpPr>
+          <p:cNvPr id="6" name="Slide Number Placeholder 5"/>
+          <p:cNvSpPr>
+            <a:spLocks noGrp="1"/>
+          </p:cNvSpPr>
+          <p:nvPr>
+            <p:ph type="sldNum" sz="quarter" idx="12"/>
+          </p:nvPr>
+        </p:nvSpPr>
+        <p:spPr/>
+        <p:txBody>
+          <a:bodyPr/>
+          <a:lstStyle/>
+          <a:p>
+            <a:fld id="{D57F1E4F-1CFF-5643-939E-02111984F565}" type="slidenum">
+              <a:rPr lang="en-US" smtClean="0"/>
+              <a:t>7</a:t>
+            </a:fld>
+            <a:endParaRPr lang="en-US" dirty="0"/>
+          </a:p>
+        </p:txBody>
+      </p:sp>
+    </p:spTree>
+    <p:extLst>
+      <p:ext uri="{BB962C8B-B14F-4D97-AF65-F5344CB8AC3E}">
+        <p14:creationId xmlns:p14="http://schemas.microsoft.com/office/powerpoint/2010/main" val="2833101456"/>
+      </p:ext>
+    </p:extLst>
+  </p:cSld>
+  <p:clrMapOvr>
+    <a:masterClrMapping/>
+  </p:clrMapOvr>
+</p:sld>
+</file>
+
+<file path=ppt/slides/slide8.xml><?xml version="1.0" encoding="utf-8"?>
+<p:sld xmlns:a="http://schemas.openxmlformats.org/drawingml/2006/main" xmlns:r="http://schemas.openxmlformats.org/officeDocument/2006/relationships" xmlns:p="http://schemas.openxmlformats.org/presentationml/2006/main">
+  <p:cSld>
+    <p:spTree>
+      <p:nvGrpSpPr>
+        <p:cNvPr id="1" name=""/>
+        <p:cNvGrpSpPr/>
+        <p:nvPr/>
+      </p:nvGrpSpPr>
+      <p:grpSpPr>
+        <a:xfrm>
+          <a:off x="0" y="0"/>
+          <a:ext cx="0" cy="0"/>
+          <a:chOff x="0" y="0"/>
+          <a:chExt cx="0" cy="0"/>
+        </a:xfrm>
+      </p:grpSpPr>
+      <p:sp>
+        <p:nvSpPr>
+          <p:cNvPr id="4" name="Title 3"/>
+          <p:cNvSpPr>
+            <a:spLocks noGrp="1"/>
+          </p:cNvSpPr>
+          <p:nvPr>
+            <p:ph type="title"/>
+          </p:nvPr>
+        </p:nvSpPr>
+        <p:spPr/>
+        <p:txBody>
+          <a:bodyPr/>
+          <a:lstStyle/>
+          <a:p>
+            <a:r>
+              <a:rPr lang="en-US" dirty="0" smtClean="0"/>
+              <a:t>PERCEPTRONS</a:t>
+            </a:r>
+            <a:endParaRPr lang="en-US" dirty="0"/>
+          </a:p>
+        </p:txBody>
+      </p:sp>
+      <p:sp>
+        <p:nvSpPr>
+          <p:cNvPr id="5" name="Content Placeholder 4"/>
+          <p:cNvSpPr>
+            <a:spLocks noGrp="1"/>
+          </p:cNvSpPr>
+          <p:nvPr>
+            <p:ph idx="1"/>
+          </p:nvPr>
+        </p:nvSpPr>
+        <p:spPr/>
+        <p:txBody>
+          <a:bodyPr/>
+          <a:lstStyle/>
+          <a:p>
+            <a:endParaRPr lang="en-US" dirty="0"/>
+          </a:p>
+        </p:txBody>
+      </p:sp>
+    </p:spTree>
+    <p:extLst>
+      <p:ext uri="{BB962C8B-B14F-4D97-AF65-F5344CB8AC3E}">
+        <p14:creationId xmlns:p14="http://schemas.microsoft.com/office/powerpoint/2010/main" val="4246251967"/>
+      </p:ext>
+    </p:extLst>
+  </p:cSld>
+  <p:clrMapOvr>
+    <a:masterClrMapping/>
+  </p:clrMapOvr>
+</p:sld>
+</file>
+
+<file path=ppt/slides/slide9.xml><?xml version="1.0" encoding="utf-8"?>
+<p:sld xmlns:a="http://schemas.openxmlformats.org/drawingml/2006/main" xmlns:r="http://schemas.openxmlformats.org/officeDocument/2006/relationships" xmlns:p="http://schemas.openxmlformats.org/presentationml/2006/main">
+  <p:cSld>
+    <p:spTree>
+      <p:nvGrpSpPr>
+        <p:cNvPr id="1" name=""/>
+        <p:cNvGrpSpPr/>
+        <p:nvPr/>
+      </p:nvGrpSpPr>
+      <p:grpSpPr>
+        <a:xfrm>
+          <a:off x="0" y="0"/>
+          <a:ext cx="0" cy="0"/>
+          <a:chOff x="0" y="0"/>
+          <a:chExt cx="0" cy="0"/>
+        </a:xfrm>
+      </p:grpSpPr>
+      <p:sp>
+        <p:nvSpPr>
+          <p:cNvPr id="7" name="Title 6"/>
+          <p:cNvSpPr>
+            <a:spLocks noGrp="1"/>
+          </p:cNvSpPr>
+          <p:nvPr>
+            <p:ph type="title"/>
+          </p:nvPr>
+        </p:nvSpPr>
+        <p:spPr/>
+        <p:txBody>
+          <a:bodyPr/>
+          <a:lstStyle/>
+          <a:p>
+            <a:r>
+              <a:rPr lang="en-US" dirty="0" smtClean="0"/>
+              <a:t>FURTHER DIRECTIONS</a:t>
+            </a:r>
+            <a:endParaRPr lang="en-US" dirty="0"/>
+          </a:p>
+        </p:txBody>
+      </p:sp>
+      <p:sp>
+        <p:nvSpPr>
+          <p:cNvPr id="8" name="Text Placeholder 7"/>
+          <p:cNvSpPr>
+            <a:spLocks noGrp="1"/>
+          </p:cNvSpPr>
+          <p:nvPr>
+            <p:ph type="body" idx="1"/>
+          </p:nvPr>
+        </p:nvSpPr>
+        <p:spPr/>
+        <p:txBody>
+          <a:bodyPr/>
+          <a:lstStyle/>
+          <a:p>
+            <a:r>
+              <a:rPr lang="en-US" dirty="0" smtClean="0"/>
+              <a:t>An overview of current research topics</a:t>
+            </a:r>
+            <a:endParaRPr lang="en-US" dirty="0"/>
+          </a:p>
+        </p:txBody>
+      </p:sp>
+      <p:sp>
+        <p:nvSpPr>
+          <p:cNvPr id="4" name="Date Placeholder 3"/>
+          <p:cNvSpPr>
+            <a:spLocks noGrp="1"/>
+          </p:cNvSpPr>
+          <p:nvPr>
+            <p:ph type="dt" sz="half" idx="10"/>
+          </p:nvPr>
+        </p:nvSpPr>
+        <p:spPr/>
+        <p:txBody>
+          <a:bodyPr/>
+          <a:lstStyle/>
+          <a:p>
+            <a:fld id="{8AAE40A0-A7D8-4DC3-BC9E-BADA32DA2004}" type="datetime4">
+              <a:rPr lang="en-US" smtClean="0"/>
+              <a:t>October 28, 2019</a:t>
+            </a:fld>
+            <a:endParaRPr lang="en-US" dirty="0"/>
+          </a:p>
+        </p:txBody>
+      </p:sp>
+      <p:sp>
+        <p:nvSpPr>
+          <p:cNvPr id="5" name="Footer Placeholder 4"/>
+          <p:cNvSpPr>
+            <a:spLocks noGrp="1"/>
+          </p:cNvSpPr>
+          <p:nvPr>
+            <p:ph type="ftr" sz="quarter" idx="11"/>
+          </p:nvPr>
+        </p:nvSpPr>
+        <p:spPr/>
+        <p:txBody>
+          <a:bodyPr/>
+          <a:lstStyle/>
+          <a:p>
+            <a:r>
+              <a:rPr lang="en-US" smtClean="0"/>
+              <a:t>Digital Scholarship Services </a:t>
+            </a:r>
+            <a:r>
+              <a:rPr lang="en-US" smtClean="0">
+                <a:solidFill>
+                  <a:schemeClr val="accent1">
+                    <a:lumMod val="50000"/>
+                  </a:schemeClr>
+                </a:solidFill>
+              </a:rPr>
+              <a:t>| Email</a:t>
+            </a:r>
+            <a:r>
+              <a:rPr lang="en-US" smtClean="0"/>
+              <a:t> cf24@rice.edu </a:t>
+            </a:r>
+            <a:r>
+              <a:rPr lang="en-US" smtClean="0">
+                <a:solidFill>
+                  <a:schemeClr val="accent1">
+                    <a:lumMod val="50000"/>
+                  </a:schemeClr>
+                </a:solidFill>
+              </a:rPr>
+              <a:t>|</a:t>
+            </a:r>
+            <a:r>
+              <a:rPr lang="en-US" smtClean="0"/>
+              <a:t> library.rice.edu/dss</a:t>
+            </a:r>
+            <a:endParaRPr lang="en-US" dirty="0"/>
+          </a:p>
+        </p:txBody>
+      </p:sp>
+      <p:sp>
+        <p:nvSpPr>
+          <p:cNvPr id="6" name="Slide Number Placeholder 5"/>
+          <p:cNvSpPr>
+            <a:spLocks noGrp="1"/>
+          </p:cNvSpPr>
+          <p:nvPr>
+            <p:ph type="sldNum" sz="quarter" idx="12"/>
+          </p:nvPr>
+        </p:nvSpPr>
+        <p:spPr/>
+        <p:txBody>
+          <a:bodyPr/>
+          <a:lstStyle/>
+          <a:p>
+            <a:fld id="{D57F1E4F-1CFF-5643-939E-02111984F565}" type="slidenum">
+              <a:rPr lang="en-US" smtClean="0"/>
+              <a:t>9</a:t>
+            </a:fld>
+            <a:endParaRPr lang="en-US" dirty="0"/>
+          </a:p>
+        </p:txBody>
+      </p:sp>
+    </p:spTree>
+    <p:extLst>
+      <p:ext uri="{BB962C8B-B14F-4D97-AF65-F5344CB8AC3E}">
+        <p14:creationId xmlns:p14="http://schemas.microsoft.com/office/powerpoint/2010/main" val="1706520227"/>
       </p:ext>
     </p:extLst>
   </p:cSld>

</xml_diff>